<commit_message>
All the file for the CdTe PVC paper accepted in September 2019
</commit_message>
<xml_diff>
--- a/Summary_figures.pptx
+++ b/Summary_figures.pptx
@@ -337,7 +337,7 @@
           <a:p>
             <a:fld id="{51797382-72E8-F64A-B418-C7FE7CE888E1}" type="datetimeFigureOut">
               <a:rPr lang="en-US" smtClean="0"/>
-              <a:t>6/11/19</a:t>
+              <a:t>8/7/19</a:t>
             </a:fld>
             <a:endParaRPr lang="en-US"/>
           </a:p>
@@ -535,7 +535,7 @@
           <a:p>
             <a:fld id="{51797382-72E8-F64A-B418-C7FE7CE888E1}" type="datetimeFigureOut">
               <a:rPr lang="en-US" smtClean="0"/>
-              <a:t>6/11/19</a:t>
+              <a:t>8/7/19</a:t>
             </a:fld>
             <a:endParaRPr lang="en-US"/>
           </a:p>
@@ -743,7 +743,7 @@
           <a:p>
             <a:fld id="{51797382-72E8-F64A-B418-C7FE7CE888E1}" type="datetimeFigureOut">
               <a:rPr lang="en-US" smtClean="0"/>
-              <a:t>6/11/19</a:t>
+              <a:t>8/7/19</a:t>
             </a:fld>
             <a:endParaRPr lang="en-US"/>
           </a:p>
@@ -941,7 +941,7 @@
           <a:p>
             <a:fld id="{51797382-72E8-F64A-B418-C7FE7CE888E1}" type="datetimeFigureOut">
               <a:rPr lang="en-US" smtClean="0"/>
-              <a:t>6/11/19</a:t>
+              <a:t>8/7/19</a:t>
             </a:fld>
             <a:endParaRPr lang="en-US"/>
           </a:p>
@@ -1216,7 +1216,7 @@
           <a:p>
             <a:fld id="{51797382-72E8-F64A-B418-C7FE7CE888E1}" type="datetimeFigureOut">
               <a:rPr lang="en-US" smtClean="0"/>
-              <a:t>6/11/19</a:t>
+              <a:t>8/7/19</a:t>
             </a:fld>
             <a:endParaRPr lang="en-US"/>
           </a:p>
@@ -1481,7 +1481,7 @@
           <a:p>
             <a:fld id="{51797382-72E8-F64A-B418-C7FE7CE888E1}" type="datetimeFigureOut">
               <a:rPr lang="en-US" smtClean="0"/>
-              <a:t>6/11/19</a:t>
+              <a:t>8/7/19</a:t>
             </a:fld>
             <a:endParaRPr lang="en-US"/>
           </a:p>
@@ -1893,7 +1893,7 @@
           <a:p>
             <a:fld id="{51797382-72E8-F64A-B418-C7FE7CE888E1}" type="datetimeFigureOut">
               <a:rPr lang="en-US" smtClean="0"/>
-              <a:t>6/11/19</a:t>
+              <a:t>8/7/19</a:t>
             </a:fld>
             <a:endParaRPr lang="en-US"/>
           </a:p>
@@ -2034,7 +2034,7 @@
           <a:p>
             <a:fld id="{51797382-72E8-F64A-B418-C7FE7CE888E1}" type="datetimeFigureOut">
               <a:rPr lang="en-US" smtClean="0"/>
-              <a:t>6/11/19</a:t>
+              <a:t>8/7/19</a:t>
             </a:fld>
             <a:endParaRPr lang="en-US"/>
           </a:p>
@@ -2147,7 +2147,7 @@
           <a:p>
             <a:fld id="{51797382-72E8-F64A-B418-C7FE7CE888E1}" type="datetimeFigureOut">
               <a:rPr lang="en-US" smtClean="0"/>
-              <a:t>6/11/19</a:t>
+              <a:t>8/7/19</a:t>
             </a:fld>
             <a:endParaRPr lang="en-US"/>
           </a:p>
@@ -2458,7 +2458,7 @@
           <a:p>
             <a:fld id="{51797382-72E8-F64A-B418-C7FE7CE888E1}" type="datetimeFigureOut">
               <a:rPr lang="en-US" smtClean="0"/>
-              <a:t>6/11/19</a:t>
+              <a:t>8/7/19</a:t>
             </a:fld>
             <a:endParaRPr lang="en-US"/>
           </a:p>
@@ -2746,7 +2746,7 @@
           <a:p>
             <a:fld id="{51797382-72E8-F64A-B418-C7FE7CE888E1}" type="datetimeFigureOut">
               <a:rPr lang="en-US" smtClean="0"/>
-              <a:t>6/11/19</a:t>
+              <a:t>8/7/19</a:t>
             </a:fld>
             <a:endParaRPr lang="en-US"/>
           </a:p>
@@ -2987,7 +2987,7 @@
           <a:p>
             <a:fld id="{51797382-72E8-F64A-B418-C7FE7CE888E1}" type="datetimeFigureOut">
               <a:rPr lang="en-US" smtClean="0"/>
-              <a:t>6/11/19</a:t>
+              <a:t>8/7/19</a:t>
             </a:fld>
             <a:endParaRPr lang="en-US"/>
           </a:p>

</xml_diff>